<commit_message>
Hopefully the real final upload
</commit_message>
<xml_diff>
--- a/lessons/workshop_introduction.pptx
+++ b/lessons/workshop_introduction.pptx
@@ -265,7 +265,7 @@
           <a:p>
             <a:fld id="{B4D147CC-DF06-4568-84A5-1913B79BC2C0}" type="datetimeFigureOut">
               <a:rPr lang="en-US" smtClean="0"/>
-              <a:t>8/5/2020</a:t>
+              <a:t>8/6/2020</a:t>
             </a:fld>
             <a:endParaRPr lang="en-US"/>
           </a:p>
@@ -463,7 +463,7 @@
           <a:p>
             <a:fld id="{B4D147CC-DF06-4568-84A5-1913B79BC2C0}" type="datetimeFigureOut">
               <a:rPr lang="en-US" smtClean="0"/>
-              <a:t>8/5/2020</a:t>
+              <a:t>8/6/2020</a:t>
             </a:fld>
             <a:endParaRPr lang="en-US"/>
           </a:p>
@@ -671,7 +671,7 @@
           <a:p>
             <a:fld id="{B4D147CC-DF06-4568-84A5-1913B79BC2C0}" type="datetimeFigureOut">
               <a:rPr lang="en-US" smtClean="0"/>
-              <a:t>8/5/2020</a:t>
+              <a:t>8/6/2020</a:t>
             </a:fld>
             <a:endParaRPr lang="en-US"/>
           </a:p>
@@ -869,7 +869,7 @@
           <a:p>
             <a:fld id="{B4D147CC-DF06-4568-84A5-1913B79BC2C0}" type="datetimeFigureOut">
               <a:rPr lang="en-US" smtClean="0"/>
-              <a:t>8/5/2020</a:t>
+              <a:t>8/6/2020</a:t>
             </a:fld>
             <a:endParaRPr lang="en-US"/>
           </a:p>
@@ -1144,7 +1144,7 @@
           <a:p>
             <a:fld id="{B4D147CC-DF06-4568-84A5-1913B79BC2C0}" type="datetimeFigureOut">
               <a:rPr lang="en-US" smtClean="0"/>
-              <a:t>8/5/2020</a:t>
+              <a:t>8/6/2020</a:t>
             </a:fld>
             <a:endParaRPr lang="en-US"/>
           </a:p>
@@ -1409,7 +1409,7 @@
           <a:p>
             <a:fld id="{B4D147CC-DF06-4568-84A5-1913B79BC2C0}" type="datetimeFigureOut">
               <a:rPr lang="en-US" smtClean="0"/>
-              <a:t>8/5/2020</a:t>
+              <a:t>8/6/2020</a:t>
             </a:fld>
             <a:endParaRPr lang="en-US"/>
           </a:p>
@@ -1821,7 +1821,7 @@
           <a:p>
             <a:fld id="{B4D147CC-DF06-4568-84A5-1913B79BC2C0}" type="datetimeFigureOut">
               <a:rPr lang="en-US" smtClean="0"/>
-              <a:t>8/5/2020</a:t>
+              <a:t>8/6/2020</a:t>
             </a:fld>
             <a:endParaRPr lang="en-US"/>
           </a:p>
@@ -1962,7 +1962,7 @@
           <a:p>
             <a:fld id="{B4D147CC-DF06-4568-84A5-1913B79BC2C0}" type="datetimeFigureOut">
               <a:rPr lang="en-US" smtClean="0"/>
-              <a:t>8/5/2020</a:t>
+              <a:t>8/6/2020</a:t>
             </a:fld>
             <a:endParaRPr lang="en-US"/>
           </a:p>
@@ -2075,7 +2075,7 @@
           <a:p>
             <a:fld id="{B4D147CC-DF06-4568-84A5-1913B79BC2C0}" type="datetimeFigureOut">
               <a:rPr lang="en-US" smtClean="0"/>
-              <a:t>8/5/2020</a:t>
+              <a:t>8/6/2020</a:t>
             </a:fld>
             <a:endParaRPr lang="en-US"/>
           </a:p>
@@ -2386,7 +2386,7 @@
           <a:p>
             <a:fld id="{B4D147CC-DF06-4568-84A5-1913B79BC2C0}" type="datetimeFigureOut">
               <a:rPr lang="en-US" smtClean="0"/>
-              <a:t>8/5/2020</a:t>
+              <a:t>8/6/2020</a:t>
             </a:fld>
             <a:endParaRPr lang="en-US"/>
           </a:p>
@@ -2674,7 +2674,7 @@
           <a:p>
             <a:fld id="{B4D147CC-DF06-4568-84A5-1913B79BC2C0}" type="datetimeFigureOut">
               <a:rPr lang="en-US" smtClean="0"/>
-              <a:t>8/5/2020</a:t>
+              <a:t>8/6/2020</a:t>
             </a:fld>
             <a:endParaRPr lang="en-US"/>
           </a:p>
@@ -2915,7 +2915,7 @@
           <a:p>
             <a:fld id="{B4D147CC-DF06-4568-84A5-1913B79BC2C0}" type="datetimeFigureOut">
               <a:rPr lang="en-US" smtClean="0"/>
-              <a:t>8/5/2020</a:t>
+              <a:t>8/6/2020</a:t>
             </a:fld>
             <a:endParaRPr lang="en-US"/>
           </a:p>
@@ -4125,7 +4125,15 @@
             <a:pPr lvl="1"/>
             <a:r>
               <a:rPr lang="en-US" dirty="0"/>
-              <a:t>Brent Pease and John </a:t>
+              <a:t>Brent Pease, Franny </a:t>
+            </a:r>
+            <a:r>
+              <a:rPr lang="en-US" dirty="0" err="1"/>
+              <a:t>Buderman</a:t>
+            </a:r>
+            <a:r>
+              <a:rPr lang="en-US" dirty="0"/>
+              <a:t>, and John </a:t>
             </a:r>
             <a:r>
               <a:rPr lang="en-US" dirty="0" err="1"/>

</xml_diff>